<commit_message>
Some improvements and bug corrects with music and images requests.
</commit_message>
<xml_diff>
--- a/Очень важные переговоры.pptx
+++ b/Очень важные переговоры.pptx
@@ -112,6 +112,11 @@
       </a:defRPr>
     </a:lvl9pPr>
   </p:defaultTextStyle>
+  <p:extLst>
+    <p:ext uri="{EFAFB233-063F-42B5-8137-9DF3F51BA10A}">
+      <p15:sldGuideLst xmlns:p15="http://schemas.microsoft.com/office/powerpoint/2012/main"/>
+    </p:ext>
+  </p:extLst>
 </p:presentation>
 </file>
 
@@ -4083,7 +4088,7 @@
                   </a:schemeClr>
                 </a:solidFill>
               </a:rPr>
-              <a:t> Основной библиотекой является</a:t>
+              <a:t> основной библиотекой является</a:t>
             </a:r>
             <a:r>
               <a:rPr lang="en-US" sz="2400" dirty="0">

</xml_diff>